<commit_message>
Fix control drop logic
</commit_message>
<xml_diff>
--- a/exercises/flow_aggregator_v2/topo.pptx
+++ b/exercises/flow_aggregator_v2/topo.pptx
@@ -5,8 +5,7 @@
     <p:sldMasterId id="2147483648" r:id="rId1"/>
   </p:sldMasterIdLst>
   <p:sldIdLst>
-    <p:sldId id="256" r:id="rId3"/>
-    <p:sldId id="257" r:id="rId4"/>
+    <p:sldId id="257" r:id="rId3"/>
   </p:sldIdLst>
   <p:sldSz cx="12192000" cy="6858000"/>
   <p:notesSz cx="7103745" cy="10234295"/>
@@ -2621,48 +2620,6 @@
         <p:nvPr/>
       </p:nvGrpSpPr>
       <p:grpSpPr/>
-      <p:pic>
-        <p:nvPicPr>
-          <p:cNvPr id="4" name="图片 3" descr="topo"/>
-          <p:cNvPicPr>
-            <a:picLocks noChangeAspect="1"/>
-          </p:cNvPicPr>
-          <p:nvPr/>
-        </p:nvPicPr>
-        <p:blipFill>
-          <a:blip r:embed="rId1"/>
-          <a:stretch>
-            <a:fillRect/>
-          </a:stretch>
-        </p:blipFill>
-        <p:spPr>
-          <a:xfrm>
-            <a:off x="1923415" y="1478280"/>
-            <a:ext cx="8344535" cy="3900805"/>
-          </a:xfrm>
-          <a:prstGeom prst="rect">
-            <a:avLst/>
-          </a:prstGeom>
-        </p:spPr>
-      </p:pic>
-    </p:spTree>
-  </p:cSld>
-  <p:clrMapOvr>
-    <a:masterClrMapping/>
-  </p:clrMapOvr>
-</p:sld>
-</file>
-
-<file path=ppt/slides/slide2.xml><?xml version="1.0" encoding="utf-8"?>
-<p:sld xmlns:a="http://schemas.openxmlformats.org/drawingml/2006/main" xmlns:r="http://schemas.openxmlformats.org/officeDocument/2006/relationships" xmlns:p="http://schemas.openxmlformats.org/presentationml/2006/main">
-  <p:cSld>
-    <p:spTree>
-      <p:nvGrpSpPr>
-        <p:cNvPr id="1" name=""/>
-        <p:cNvGrpSpPr/>
-        <p:nvPr/>
-      </p:nvGrpSpPr>
-      <p:grpSpPr/>
       <p:sp>
         <p:nvSpPr>
           <p:cNvPr id="2" name="矩形 1"/>

</xml_diff>